<commit_message>
[cpp] Adding cv9, cv10 presentations and notes
</commit_message>
<xml_diff>
--- a/data/2018-19/cpp/cv9/cpp_cv9.pptx
+++ b/data/2018-19/cpp/cv9/cpp_cv9.pptx
@@ -8,8 +8,9 @@
     <p:sldId id="256" r:id="rId2"/>
     <p:sldId id="258" r:id="rId3"/>
     <p:sldId id="260" r:id="rId4"/>
-    <p:sldId id="259" r:id="rId5"/>
-    <p:sldId id="257" r:id="rId6"/>
+    <p:sldId id="261" r:id="rId5"/>
+    <p:sldId id="259" r:id="rId6"/>
+    <p:sldId id="257" r:id="rId7"/>
   </p:sldIdLst>
   <p:sldSz cx="12192000" cy="6858000"/>
   <p:notesSz cx="6858000" cy="9144000"/>
@@ -108,6 +109,11 @@
       </a:defRPr>
     </a:lvl9pPr>
   </p:defaultTextStyle>
+  <p:extLst>
+    <p:ext uri="{EFAFB233-063F-42B5-8137-9DF3F51BA10A}">
+      <p15:sldGuideLst xmlns:p15="http://schemas.microsoft.com/office/powerpoint/2012/main"/>
+    </p:ext>
+  </p:extLst>
 </p:presentation>
 </file>
 
@@ -7696,6 +7702,13 @@
   <p:clrMapOvr>
     <a:masterClrMapping/>
   </p:clrMapOvr>
+  <p:timing>
+    <p:tnLst>
+      <p:par>
+        <p:cTn id="1" dur="indefinite" restart="never" nodeType="tmRoot"/>
+      </p:par>
+    </p:tnLst>
+  </p:timing>
 </p:sld>
 </file>
 
@@ -7866,6 +7879,13 @@
   <p:clrMapOvr>
     <a:masterClrMapping/>
   </p:clrMapOvr>
+  <p:timing>
+    <p:tnLst>
+      <p:par>
+        <p:cTn id="1" dur="indefinite" restart="never" nodeType="tmRoot"/>
+      </p:par>
+    </p:tnLst>
+  </p:timing>
 </p:sld>
 </file>
 
@@ -8314,6 +8334,13 @@
   <p:clrMapOvr>
     <a:masterClrMapping/>
   </p:clrMapOvr>
+  <p:timing>
+    <p:tnLst>
+      <p:par>
+        <p:cTn id="1" dur="indefinite" restart="never" nodeType="tmRoot"/>
+      </p:par>
+    </p:tnLst>
+  </p:timing>
 </p:sld>
 </file>
 
@@ -8350,8 +8377,12 @@
           <a:lstStyle/>
           <a:p>
             <a:r>
+              <a:rPr lang="en-US" dirty="0" err="1" smtClean="0"/>
+              <a:t>Generov</a:t>
+            </a:r>
+            <a:r>
               <a:rPr lang="cs-CZ" dirty="0" smtClean="0"/>
-              <a:t>Úkoly</a:t>
+              <a:t>ání</a:t>
             </a:r>
             <a:endParaRPr lang="cs-CZ" dirty="0"/>
           </a:p>
@@ -8374,26 +8405,98 @@
           <a:p>
             <a:r>
               <a:rPr lang="cs-CZ" dirty="0" smtClean="0"/>
-              <a:t>Agregace </a:t>
-            </a:r>
-            <a:r>
-              <a:rPr lang="cs-CZ" smtClean="0"/>
-              <a:t>v databázi</a:t>
-            </a:r>
-            <a:endParaRPr lang="cs-CZ" dirty="0"/>
+              <a:t>&lt;algorithm&gt;</a:t>
+            </a:r>
+          </a:p>
+          <a:p>
+            <a:pPr lvl="1"/>
+            <a:r>
+              <a:rPr lang="en-US" dirty="0" err="1" smtClean="0"/>
+              <a:t>std</a:t>
+            </a:r>
+            <a:r>
+              <a:rPr lang="en-US" dirty="0" smtClean="0"/>
+              <a:t>::generate, </a:t>
+            </a:r>
+            <a:r>
+              <a:rPr lang="en-US" dirty="0" err="1" smtClean="0"/>
+              <a:t>std</a:t>
+            </a:r>
+            <a:r>
+              <a:rPr lang="en-US" dirty="0" smtClean="0"/>
+              <a:t>::</a:t>
+            </a:r>
+            <a:r>
+              <a:rPr lang="en-US" dirty="0" err="1" smtClean="0"/>
+              <a:t>generate_n</a:t>
+            </a:r>
+            <a:endParaRPr lang="en-US" dirty="0" smtClean="0"/>
+          </a:p>
+          <a:p>
+            <a:pPr lvl="1"/>
+            <a:r>
+              <a:rPr lang="en-US" dirty="0" err="1" smtClean="0"/>
+              <a:t>std</a:t>
+            </a:r>
+            <a:r>
+              <a:rPr lang="en-US" dirty="0" smtClean="0"/>
+              <a:t>::fill, </a:t>
+            </a:r>
+            <a:r>
+              <a:rPr lang="en-US" dirty="0" err="1" smtClean="0"/>
+              <a:t>std</a:t>
+            </a:r>
+            <a:r>
+              <a:rPr lang="en-US" dirty="0" smtClean="0"/>
+              <a:t>::</a:t>
+            </a:r>
+            <a:r>
+              <a:rPr lang="en-US" dirty="0" err="1" smtClean="0"/>
+              <a:t>fill_n</a:t>
+            </a:r>
+            <a:endParaRPr lang="en-US" dirty="0" smtClean="0"/>
+          </a:p>
+          <a:p>
+            <a:r>
+              <a:rPr lang="en-US" dirty="0" smtClean="0"/>
+              <a:t>&lt;numeric&gt;</a:t>
+            </a:r>
+          </a:p>
+          <a:p>
+            <a:pPr lvl="1"/>
+            <a:r>
+              <a:rPr lang="en-US" dirty="0" err="1"/>
+              <a:t>std</a:t>
+            </a:r>
+            <a:r>
+              <a:rPr lang="en-US" dirty="0"/>
+              <a:t>::</a:t>
+            </a:r>
+            <a:r>
+              <a:rPr lang="en-US" dirty="0" smtClean="0"/>
+              <a:t>iota</a:t>
+            </a:r>
+            <a:endParaRPr lang="en-US" dirty="0"/>
           </a:p>
         </p:txBody>
       </p:sp>
     </p:spTree>
     <p:extLst>
       <p:ext uri="{BB962C8B-B14F-4D97-AF65-F5344CB8AC3E}">
-        <p14:creationId xmlns:p14="http://schemas.microsoft.com/office/powerpoint/2010/main" val="3321970578"/>
+        <p14:creationId xmlns:p14="http://schemas.microsoft.com/office/powerpoint/2010/main" val="1487036722"/>
       </p:ext>
     </p:extLst>
   </p:cSld>
   <p:clrMapOvr>
     <a:masterClrMapping/>
   </p:clrMapOvr>
+  <p:timing>
+    <p:tnLst>
+      <p:par>
+        <p:cTn id="1" dur="indefinite" restart="never" nodeType="tmRoot"/>
+      </p:par>
+    </p:tnLst>
+  </p:timing>
 </p:sld>
 </file>
 
@@ -8431,6 +8534,187 @@
           <a:p>
             <a:r>
               <a:rPr lang="cs-CZ" dirty="0" smtClean="0"/>
+              <a:t>Úkoly</a:t>
+            </a:r>
+            <a:endParaRPr lang="cs-CZ" dirty="0"/>
+          </a:p>
+        </p:txBody>
+      </p:sp>
+      <p:sp>
+        <p:nvSpPr>
+          <p:cNvPr id="3" name="Content Placeholder 2"/>
+          <p:cNvSpPr>
+            <a:spLocks noGrp="1"/>
+          </p:cNvSpPr>
+          <p:nvPr>
+            <p:ph idx="1"/>
+          </p:nvPr>
+        </p:nvSpPr>
+        <p:spPr/>
+        <p:txBody>
+          <a:bodyPr/>
+          <a:lstStyle/>
+          <a:p>
+            <a:r>
+              <a:rPr lang="en-US" dirty="0" err="1" smtClean="0"/>
+              <a:t>Agregace</a:t>
+            </a:r>
+            <a:r>
+              <a:rPr lang="en-US" dirty="0" smtClean="0"/>
+              <a:t> v </a:t>
+            </a:r>
+            <a:r>
+              <a:rPr lang="cs-CZ" dirty="0" smtClean="0"/>
+              <a:t>databázi v paměti – GROUP BY (DISTINCT)</a:t>
+            </a:r>
+          </a:p>
+          <a:p>
+            <a:pPr marL="800100" lvl="1" indent="-342900">
+              <a:buFont typeface="+mj-lt"/>
+              <a:buAutoNum type="arabicPeriod"/>
+            </a:pPr>
+            <a:r>
+              <a:rPr lang="cs-CZ" dirty="0" smtClean="0"/>
+              <a:t>Nagenerujte si do paměti několik sloupců pro databázi</a:t>
+            </a:r>
+            <a:endParaRPr lang="en-US" dirty="0" smtClean="0"/>
+          </a:p>
+          <a:p>
+            <a:pPr marL="1200150" lvl="2" indent="-342900">
+              <a:buFont typeface="+mj-lt"/>
+              <a:buAutoNum type="arabicPeriod"/>
+            </a:pPr>
+            <a:r>
+              <a:rPr lang="en-US" dirty="0" smtClean="0"/>
+              <a:t>&lt;algorithm&gt;</a:t>
+            </a:r>
+            <a:endParaRPr lang="cs-CZ" dirty="0" smtClean="0"/>
+          </a:p>
+          <a:p>
+            <a:pPr marL="800100" lvl="1" indent="-342900">
+              <a:buFont typeface="+mj-lt"/>
+              <a:buAutoNum type="arabicPeriod"/>
+            </a:pPr>
+            <a:r>
+              <a:rPr lang="cs-CZ" dirty="0" smtClean="0"/>
+              <a:t>Určete za běhu, podle kterého sloupce chcete agregovat výsledky</a:t>
+            </a:r>
+          </a:p>
+          <a:p>
+            <a:pPr marL="1200150" lvl="2" indent="-342900">
+              <a:buFont typeface="+mj-lt"/>
+              <a:buAutoNum type="arabicPeriod"/>
+            </a:pPr>
+            <a:r>
+              <a:rPr lang="cs-CZ" dirty="0" smtClean="0"/>
+              <a:t>map</a:t>
+            </a:r>
+            <a:r>
+              <a:rPr lang="en-US" dirty="0" smtClean="0"/>
+              <a:t>/</a:t>
+            </a:r>
+            <a:r>
+              <a:rPr lang="en-US" dirty="0" err="1" smtClean="0"/>
+              <a:t>unordered_map</a:t>
+            </a:r>
+            <a:endParaRPr lang="cs-CZ" dirty="0" smtClean="0"/>
+          </a:p>
+          <a:p>
+            <a:pPr marL="800100" lvl="1" indent="-342900">
+              <a:buFont typeface="+mj-lt"/>
+              <a:buAutoNum type="arabicPeriod"/>
+            </a:pPr>
+            <a:r>
+              <a:rPr lang="cs-CZ" dirty="0" smtClean="0"/>
+              <a:t>Určtete za běhu, podle kterého sloupce chcete agregovat </a:t>
+            </a:r>
+            <a:r>
+              <a:rPr lang="cs-CZ" b="1" dirty="0" smtClean="0"/>
+              <a:t>unikátní </a:t>
+            </a:r>
+            <a:r>
+              <a:rPr lang="cs-CZ" dirty="0" smtClean="0"/>
+              <a:t>výsledky</a:t>
+            </a:r>
+          </a:p>
+          <a:p>
+            <a:pPr marL="1200150" lvl="2" indent="-342900">
+              <a:buFont typeface="+mj-lt"/>
+              <a:buAutoNum type="arabicPeriod"/>
+            </a:pPr>
+            <a:r>
+              <a:rPr lang="en-US" dirty="0" smtClean="0"/>
+              <a:t>set/</a:t>
+            </a:r>
+            <a:r>
+              <a:rPr lang="en-US" dirty="0" err="1" smtClean="0"/>
+              <a:t>unordered_set</a:t>
+            </a:r>
+            <a:endParaRPr lang="cs-CZ" dirty="0" smtClean="0"/>
+          </a:p>
+          <a:p>
+            <a:pPr lvl="1"/>
+            <a:endParaRPr lang="cs-CZ" dirty="0" smtClean="0"/>
+          </a:p>
+          <a:p>
+            <a:endParaRPr lang="cs-CZ" dirty="0"/>
+          </a:p>
+        </p:txBody>
+      </p:sp>
+    </p:spTree>
+    <p:extLst>
+      <p:ext uri="{BB962C8B-B14F-4D97-AF65-F5344CB8AC3E}">
+        <p14:creationId xmlns:p14="http://schemas.microsoft.com/office/powerpoint/2010/main" val="3321970578"/>
+      </p:ext>
+    </p:extLst>
+  </p:cSld>
+  <p:clrMapOvr>
+    <a:masterClrMapping/>
+  </p:clrMapOvr>
+  <p:timing>
+    <p:tnLst>
+      <p:par>
+        <p:cTn id="1" dur="indefinite" restart="never" nodeType="tmRoot"/>
+      </p:par>
+    </p:tnLst>
+  </p:timing>
+</p:sld>
+</file>
+
+<file path=ppt/slides/slide6.xml><?xml version="1.0" encoding="utf-8"?>
+<p:sld xmlns:a="http://schemas.openxmlformats.org/drawingml/2006/main" xmlns:r="http://schemas.openxmlformats.org/officeDocument/2006/relationships" xmlns:p="http://schemas.openxmlformats.org/presentationml/2006/main">
+  <p:cSld>
+    <p:spTree>
+      <p:nvGrpSpPr>
+        <p:cNvPr id="1" name=""/>
+        <p:cNvGrpSpPr/>
+        <p:nvPr/>
+      </p:nvGrpSpPr>
+      <p:grpSpPr>
+        <a:xfrm>
+          <a:off x="0" y="0"/>
+          <a:ext cx="0" cy="0"/>
+          <a:chOff x="0" y="0"/>
+          <a:chExt cx="0" cy="0"/>
+        </a:xfrm>
+      </p:grpSpPr>
+      <p:sp>
+        <p:nvSpPr>
+          <p:cNvPr id="2" name="Title 1"/>
+          <p:cNvSpPr>
+            <a:spLocks noGrp="1"/>
+          </p:cNvSpPr>
+          <p:nvPr>
+            <p:ph type="title"/>
+          </p:nvPr>
+        </p:nvSpPr>
+        <p:spPr/>
+        <p:txBody>
+          <a:bodyPr/>
+          <a:lstStyle/>
+          <a:p>
+            <a:r>
+              <a:rPr lang="cs-CZ" dirty="0" smtClean="0"/>
               <a:t>Domácí úkol – „databáze“</a:t>
             </a:r>
             <a:endParaRPr lang="cs-CZ" dirty="0"/>
@@ -8503,6 +8787,13 @@
   <p:clrMapOvr>
     <a:masterClrMapping/>
   </p:clrMapOvr>
+  <p:timing>
+    <p:tnLst>
+      <p:par>
+        <p:cTn id="1" dur="indefinite" restart="never" nodeType="tmRoot"/>
+      </p:par>
+    </p:tnLst>
+  </p:timing>
 </p:sld>
 </file>
 

</xml_diff>